<commit_message>
Add research tactics to ppt
</commit_message>
<xml_diff>
--- a/Persona profiles.pptx
+++ b/Persona profiles.pptx
@@ -12,6 +12,9 @@
     <p:sldId id="260" r:id="rId6"/>
     <p:sldId id="261" r:id="rId7"/>
     <p:sldId id="262" r:id="rId8"/>
+    <p:sldId id="263" r:id="rId9"/>
+    <p:sldId id="264" r:id="rId10"/>
+    <p:sldId id="265" r:id="rId11"/>
   </p:sldIdLst>
   <p:sldSz cx="12192000" cy="6858000"/>
   <p:notesSz cx="6858000" cy="9144000"/>
@@ -110,6 +113,11 @@
       </a:defRPr>
     </a:lvl9pPr>
   </p:defaultTextStyle>
+  <p:extLst>
+    <p:ext uri="{EFAFB233-063F-42B5-8137-9DF3F51BA10A}">
+      <p15:sldGuideLst xmlns:p15="http://schemas.microsoft.com/office/powerpoint/2012/main"/>
+    </p:ext>
+  </p:extLst>
 </p:presentation>
 </file>
 
@@ -260,7 +268,7 @@
           <a:p>
             <a:fld id="{48097A43-A70A-4052-884F-D59263469F6F}" type="datetimeFigureOut">
               <a:rPr lang="en-US" smtClean="0"/>
-              <a:t>5/20/2025</a:t>
+              <a:t>5/21/2025</a:t>
             </a:fld>
             <a:endParaRPr lang="en-US"/>
           </a:p>
@@ -458,7 +466,7 @@
           <a:p>
             <a:fld id="{48097A43-A70A-4052-884F-D59263469F6F}" type="datetimeFigureOut">
               <a:rPr lang="en-US" smtClean="0"/>
-              <a:t>5/20/2025</a:t>
+              <a:t>5/21/2025</a:t>
             </a:fld>
             <a:endParaRPr lang="en-US"/>
           </a:p>
@@ -666,7 +674,7 @@
           <a:p>
             <a:fld id="{48097A43-A70A-4052-884F-D59263469F6F}" type="datetimeFigureOut">
               <a:rPr lang="en-US" smtClean="0"/>
-              <a:t>5/20/2025</a:t>
+              <a:t>5/21/2025</a:t>
             </a:fld>
             <a:endParaRPr lang="en-US"/>
           </a:p>
@@ -864,7 +872,7 @@
           <a:p>
             <a:fld id="{48097A43-A70A-4052-884F-D59263469F6F}" type="datetimeFigureOut">
               <a:rPr lang="en-US" smtClean="0"/>
-              <a:t>5/20/2025</a:t>
+              <a:t>5/21/2025</a:t>
             </a:fld>
             <a:endParaRPr lang="en-US"/>
           </a:p>
@@ -1139,7 +1147,7 @@
           <a:p>
             <a:fld id="{48097A43-A70A-4052-884F-D59263469F6F}" type="datetimeFigureOut">
               <a:rPr lang="en-US" smtClean="0"/>
-              <a:t>5/20/2025</a:t>
+              <a:t>5/21/2025</a:t>
             </a:fld>
             <a:endParaRPr lang="en-US"/>
           </a:p>
@@ -1404,7 +1412,7 @@
           <a:p>
             <a:fld id="{48097A43-A70A-4052-884F-D59263469F6F}" type="datetimeFigureOut">
               <a:rPr lang="en-US" smtClean="0"/>
-              <a:t>5/20/2025</a:t>
+              <a:t>5/21/2025</a:t>
             </a:fld>
             <a:endParaRPr lang="en-US"/>
           </a:p>
@@ -1816,7 +1824,7 @@
           <a:p>
             <a:fld id="{48097A43-A70A-4052-884F-D59263469F6F}" type="datetimeFigureOut">
               <a:rPr lang="en-US" smtClean="0"/>
-              <a:t>5/20/2025</a:t>
+              <a:t>5/21/2025</a:t>
             </a:fld>
             <a:endParaRPr lang="en-US"/>
           </a:p>
@@ -1957,7 +1965,7 @@
           <a:p>
             <a:fld id="{48097A43-A70A-4052-884F-D59263469F6F}" type="datetimeFigureOut">
               <a:rPr lang="en-US" smtClean="0"/>
-              <a:t>5/20/2025</a:t>
+              <a:t>5/21/2025</a:t>
             </a:fld>
             <a:endParaRPr lang="en-US"/>
           </a:p>
@@ -2070,7 +2078,7 @@
           <a:p>
             <a:fld id="{48097A43-A70A-4052-884F-D59263469F6F}" type="datetimeFigureOut">
               <a:rPr lang="en-US" smtClean="0"/>
-              <a:t>5/20/2025</a:t>
+              <a:t>5/21/2025</a:t>
             </a:fld>
             <a:endParaRPr lang="en-US"/>
           </a:p>
@@ -2381,7 +2389,7 @@
           <a:p>
             <a:fld id="{48097A43-A70A-4052-884F-D59263469F6F}" type="datetimeFigureOut">
               <a:rPr lang="en-US" smtClean="0"/>
-              <a:t>5/20/2025</a:t>
+              <a:t>5/21/2025</a:t>
             </a:fld>
             <a:endParaRPr lang="en-US"/>
           </a:p>
@@ -2669,7 +2677,7 @@
           <a:p>
             <a:fld id="{48097A43-A70A-4052-884F-D59263469F6F}" type="datetimeFigureOut">
               <a:rPr lang="en-US" smtClean="0"/>
-              <a:t>5/20/2025</a:t>
+              <a:t>5/21/2025</a:t>
             </a:fld>
             <a:endParaRPr lang="en-US"/>
           </a:p>
@@ -2910,7 +2918,7 @@
           <a:p>
             <a:fld id="{48097A43-A70A-4052-884F-D59263469F6F}" type="datetimeFigureOut">
               <a:rPr lang="en-US" smtClean="0"/>
-              <a:t>5/20/2025</a:t>
+              <a:t>5/21/2025</a:t>
             </a:fld>
             <a:endParaRPr lang="en-US"/>
           </a:p>
@@ -3388,7 +3396,7 @@
               <a:rPr lang="en-US" sz="7200" dirty="0">
                 <a:latin typeface="Arial Black" panose="020B0A04020102020204" pitchFamily="34" charset="0"/>
               </a:rPr>
-              <a:t>Persona profiles</a:t>
+              <a:t>Persona Profiles</a:t>
             </a:r>
           </a:p>
         </p:txBody>
@@ -3430,6 +3438,428 @@
     <p:extLst>
       <p:ext uri="{BB962C8B-B14F-4D97-AF65-F5344CB8AC3E}">
         <p14:creationId xmlns:p14="http://schemas.microsoft.com/office/powerpoint/2010/main" val="3937245792"/>
+      </p:ext>
+    </p:extLst>
+  </p:cSld>
+  <p:clrMapOvr>
+    <a:masterClrMapping/>
+  </p:clrMapOvr>
+</p:sld>
+</file>
+
+<file path=ppt/slides/slide10.xml><?xml version="1.0" encoding="utf-8"?>
+<p:sld xmlns:a="http://schemas.openxmlformats.org/drawingml/2006/main" xmlns:r="http://schemas.openxmlformats.org/officeDocument/2006/relationships" xmlns:p="http://schemas.openxmlformats.org/presentationml/2006/main">
+  <p:cSld>
+    <p:bg>
+      <p:bgPr>
+        <a:gradFill>
+          <a:gsLst>
+            <a:gs pos="0">
+              <a:schemeClr val="accent1">
+                <a:lumMod val="5000"/>
+                <a:lumOff val="95000"/>
+              </a:schemeClr>
+            </a:gs>
+            <a:gs pos="74000">
+              <a:schemeClr val="accent1">
+                <a:lumMod val="45000"/>
+                <a:lumOff val="55000"/>
+              </a:schemeClr>
+            </a:gs>
+            <a:gs pos="83000">
+              <a:schemeClr val="accent1">
+                <a:lumMod val="45000"/>
+                <a:lumOff val="55000"/>
+              </a:schemeClr>
+            </a:gs>
+            <a:gs pos="100000">
+              <a:schemeClr val="accent1">
+                <a:lumMod val="30000"/>
+                <a:lumOff val="70000"/>
+              </a:schemeClr>
+            </a:gs>
+          </a:gsLst>
+          <a:lin ang="5400000" scaled="1"/>
+        </a:gradFill>
+        <a:effectLst/>
+      </p:bgPr>
+    </p:bg>
+    <p:spTree>
+      <p:nvGrpSpPr>
+        <p:cNvPr id="1" name=""/>
+        <p:cNvGrpSpPr/>
+        <p:nvPr/>
+      </p:nvGrpSpPr>
+      <p:grpSpPr>
+        <a:xfrm>
+          <a:off x="0" y="0"/>
+          <a:ext cx="0" cy="0"/>
+          <a:chOff x="0" y="0"/>
+          <a:chExt cx="0" cy="0"/>
+        </a:xfrm>
+      </p:grpSpPr>
+      <p:sp>
+        <p:nvSpPr>
+          <p:cNvPr id="2" name="Title 1">
+            <a:extLst>
+              <a:ext uri="{FF2B5EF4-FFF2-40B4-BE49-F238E27FC236}">
+                <a16:creationId xmlns:a16="http://schemas.microsoft.com/office/drawing/2014/main" id="{827C60D1-1B17-1A27-59C5-D59DBD15F2FB}"/>
+              </a:ext>
+            </a:extLst>
+          </p:cNvPr>
+          <p:cNvSpPr>
+            <a:spLocks noGrp="1"/>
+          </p:cNvSpPr>
+          <p:nvPr>
+            <p:ph type="title"/>
+          </p:nvPr>
+        </p:nvSpPr>
+        <p:spPr>
+          <a:xfrm>
+            <a:off x="838200" y="365125"/>
+            <a:ext cx="10515600" cy="1196975"/>
+          </a:xfrm>
+        </p:spPr>
+        <p:txBody>
+          <a:bodyPr/>
+          <a:lstStyle/>
+          <a:p>
+            <a:r>
+              <a:rPr lang="en-US" b="0" i="0" dirty="0">
+                <a:solidFill>
+                  <a:srgbClr val="454545"/>
+                </a:solidFill>
+                <a:effectLst/>
+                <a:latin typeface="proxima-nova"/>
+              </a:rPr>
+              <a:t>Competitive Analysis</a:t>
+            </a:r>
+            <a:endParaRPr lang="en-US" dirty="0"/>
+          </a:p>
+        </p:txBody>
+      </p:sp>
+      <p:graphicFrame>
+        <p:nvGraphicFramePr>
+          <p:cNvPr id="4" name="Content Placeholder 3">
+            <a:extLst>
+              <a:ext uri="{FF2B5EF4-FFF2-40B4-BE49-F238E27FC236}">
+                <a16:creationId xmlns:a16="http://schemas.microsoft.com/office/drawing/2014/main" id="{0BF3F7D8-65FB-A1CE-106D-90D49592102D}"/>
+              </a:ext>
+            </a:extLst>
+          </p:cNvPr>
+          <p:cNvGraphicFramePr>
+            <a:graphicFrameLocks noGrp="1"/>
+          </p:cNvGraphicFramePr>
+          <p:nvPr>
+            <p:ph idx="1"/>
+            <p:extLst>
+              <p:ext uri="{D42A27DB-BD31-4B8C-83A1-F6EECF244321}">
+                <p14:modId xmlns:p14="http://schemas.microsoft.com/office/powerpoint/2010/main" val="2030972920"/>
+              </p:ext>
+            </p:extLst>
+          </p:nvPr>
+        </p:nvGraphicFramePr>
+        <p:xfrm>
+          <a:off x="923925" y="4392156"/>
+          <a:ext cx="10515597" cy="1483360"/>
+        </p:xfrm>
+        <a:graphic>
+          <a:graphicData uri="http://schemas.openxmlformats.org/drawingml/2006/table">
+            <a:tbl>
+              <a:tblPr firstRow="1" bandRow="1">
+                <a:tableStyleId>{5C22544A-7EE6-4342-B048-85BDC9FD1C3A}</a:tableStyleId>
+              </a:tblPr>
+              <a:tblGrid>
+                <a:gridCol w="3505199">
+                  <a:extLst>
+                    <a:ext uri="{9D8B030D-6E8A-4147-A177-3AD203B41FA5}">
+                      <a16:colId xmlns:a16="http://schemas.microsoft.com/office/drawing/2014/main" val="481333316"/>
+                    </a:ext>
+                  </a:extLst>
+                </a:gridCol>
+                <a:gridCol w="3505199">
+                  <a:extLst>
+                    <a:ext uri="{9D8B030D-6E8A-4147-A177-3AD203B41FA5}">
+                      <a16:colId xmlns:a16="http://schemas.microsoft.com/office/drawing/2014/main" val="3588976954"/>
+                    </a:ext>
+                  </a:extLst>
+                </a:gridCol>
+                <a:gridCol w="3505199">
+                  <a:extLst>
+                    <a:ext uri="{9D8B030D-6E8A-4147-A177-3AD203B41FA5}">
+                      <a16:colId xmlns:a16="http://schemas.microsoft.com/office/drawing/2014/main" val="4252826625"/>
+                    </a:ext>
+                  </a:extLst>
+                </a:gridCol>
+              </a:tblGrid>
+              <a:tr h="370840">
+                <a:tc>
+                  <a:txBody>
+                    <a:bodyPr/>
+                    <a:lstStyle/>
+                    <a:p>
+                      <a:r>
+                        <a:rPr lang="en-US" dirty="0"/>
+                        <a:t>App</a:t>
+                      </a:r>
+                    </a:p>
+                  </a:txBody>
+                  <a:tcPr/>
+                </a:tc>
+                <a:tc>
+                  <a:txBody>
+                    <a:bodyPr/>
+                    <a:lstStyle/>
+                    <a:p>
+                      <a:r>
+                        <a:rPr lang="en-US" dirty="0"/>
+                        <a:t>What we liked</a:t>
+                      </a:r>
+                    </a:p>
+                  </a:txBody>
+                  <a:tcPr/>
+                </a:tc>
+                <a:tc>
+                  <a:txBody>
+                    <a:bodyPr/>
+                    <a:lstStyle/>
+                    <a:p>
+                      <a:r>
+                        <a:rPr lang="en-US" dirty="0"/>
+                        <a:t>What’s missing</a:t>
+                      </a:r>
+                    </a:p>
+                  </a:txBody>
+                  <a:tcPr/>
+                </a:tc>
+                <a:extLst>
+                  <a:ext uri="{0D108BD9-81ED-4DB2-BD59-A6C34878D82A}">
+                    <a16:rowId xmlns:a16="http://schemas.microsoft.com/office/drawing/2014/main" val="543011088"/>
+                  </a:ext>
+                </a:extLst>
+              </a:tr>
+              <a:tr h="370840">
+                <a:tc>
+                  <a:txBody>
+                    <a:bodyPr/>
+                    <a:lstStyle/>
+                    <a:p>
+                      <a:r>
+                        <a:rPr lang="en-US" dirty="0"/>
+                        <a:t>LEGO Builder</a:t>
+                      </a:r>
+                    </a:p>
+                  </a:txBody>
+                  <a:tcPr/>
+                </a:tc>
+                <a:tc>
+                  <a:txBody>
+                    <a:bodyPr/>
+                    <a:lstStyle/>
+                    <a:p>
+                      <a:r>
+                        <a:rPr lang="en-US" dirty="0"/>
+                        <a:t>Easy to follow, high quality visuals</a:t>
+                      </a:r>
+                    </a:p>
+                  </a:txBody>
+                  <a:tcPr/>
+                </a:tc>
+                <a:tc>
+                  <a:txBody>
+                    <a:bodyPr/>
+                    <a:lstStyle/>
+                    <a:p>
+                      <a:r>
+                        <a:rPr lang="en-US" dirty="0"/>
+                        <a:t>No AR/MR integration</a:t>
+                      </a:r>
+                    </a:p>
+                  </a:txBody>
+                  <a:tcPr/>
+                </a:tc>
+                <a:extLst>
+                  <a:ext uri="{0D108BD9-81ED-4DB2-BD59-A6C34878D82A}">
+                    <a16:rowId xmlns:a16="http://schemas.microsoft.com/office/drawing/2014/main" val="2657928721"/>
+                  </a:ext>
+                </a:extLst>
+              </a:tr>
+              <a:tr h="370840">
+                <a:tc>
+                  <a:txBody>
+                    <a:bodyPr/>
+                    <a:lstStyle/>
+                    <a:p>
+                      <a:r>
+                        <a:rPr lang="en-US" dirty="0"/>
+                        <a:t>Merge EDU</a:t>
+                      </a:r>
+                    </a:p>
+                  </a:txBody>
+                  <a:tcPr/>
+                </a:tc>
+                <a:tc>
+                  <a:txBody>
+                    <a:bodyPr/>
+                    <a:lstStyle/>
+                    <a:p>
+                      <a:r>
+                        <a:rPr lang="en-US" dirty="0"/>
+                        <a:t>Great headset-based walkthrough</a:t>
+                      </a:r>
+                    </a:p>
+                  </a:txBody>
+                  <a:tcPr/>
+                </a:tc>
+                <a:tc>
+                  <a:txBody>
+                    <a:bodyPr/>
+                    <a:lstStyle/>
+                    <a:p>
+                      <a:r>
+                        <a:rPr lang="en-US" dirty="0"/>
+                        <a:t>No game-like feedback, less playful</a:t>
+                      </a:r>
+                    </a:p>
+                  </a:txBody>
+                  <a:tcPr/>
+                </a:tc>
+                <a:extLst>
+                  <a:ext uri="{0D108BD9-81ED-4DB2-BD59-A6C34878D82A}">
+                    <a16:rowId xmlns:a16="http://schemas.microsoft.com/office/drawing/2014/main" val="3589786762"/>
+                  </a:ext>
+                </a:extLst>
+              </a:tr>
+              <a:tr h="370840">
+                <a:tc>
+                  <a:txBody>
+                    <a:bodyPr/>
+                    <a:lstStyle/>
+                    <a:p>
+                      <a:r>
+                        <a:rPr lang="en-US" dirty="0" err="1"/>
+                        <a:t>JigSpace</a:t>
+                      </a:r>
+                      <a:endParaRPr lang="en-US" dirty="0"/>
+                    </a:p>
+                  </a:txBody>
+                  <a:tcPr/>
+                </a:tc>
+                <a:tc>
+                  <a:txBody>
+                    <a:bodyPr/>
+                    <a:lstStyle/>
+                    <a:p>
+                      <a:r>
+                        <a:rPr lang="en-US" dirty="0"/>
+                        <a:t>AR build steps with visual depth</a:t>
+                      </a:r>
+                    </a:p>
+                  </a:txBody>
+                  <a:tcPr/>
+                </a:tc>
+                <a:tc>
+                  <a:txBody>
+                    <a:bodyPr/>
+                    <a:lstStyle/>
+                    <a:p>
+                      <a:r>
+                        <a:rPr lang="en-US" dirty="0"/>
+                        <a:t>Limited to certain platforms (IOS)</a:t>
+                      </a:r>
+                    </a:p>
+                  </a:txBody>
+                  <a:tcPr/>
+                </a:tc>
+                <a:extLst>
+                  <a:ext uri="{0D108BD9-81ED-4DB2-BD59-A6C34878D82A}">
+                    <a16:rowId xmlns:a16="http://schemas.microsoft.com/office/drawing/2014/main" val="1958324164"/>
+                  </a:ext>
+                </a:extLst>
+              </a:tr>
+            </a:tbl>
+          </a:graphicData>
+        </a:graphic>
+      </p:graphicFrame>
+      <p:sp>
+        <p:nvSpPr>
+          <p:cNvPr id="5" name="TextBox 4">
+            <a:extLst>
+              <a:ext uri="{FF2B5EF4-FFF2-40B4-BE49-F238E27FC236}">
+                <a16:creationId xmlns:a16="http://schemas.microsoft.com/office/drawing/2014/main" id="{20051EFA-7DE4-B113-2175-D5D58BFD2522}"/>
+              </a:ext>
+            </a:extLst>
+          </p:cNvPr>
+          <p:cNvSpPr txBox="1"/>
+          <p:nvPr/>
+        </p:nvSpPr>
+        <p:spPr>
+          <a:xfrm>
+            <a:off x="838200" y="1638300"/>
+            <a:ext cx="10848975" cy="2677656"/>
+          </a:xfrm>
+          <a:prstGeom prst="rect">
+            <a:avLst/>
+          </a:prstGeom>
+          <a:noFill/>
+        </p:spPr>
+        <p:txBody>
+          <a:bodyPr wrap="square" rtlCol="0">
+            <a:spAutoFit/>
+          </a:bodyPr>
+          <a:lstStyle/>
+          <a:p>
+            <a:r>
+              <a:rPr lang="en-US" dirty="0"/>
+              <a:t>Competitor Analysis Sheet : </a:t>
+            </a:r>
+            <a:r>
+              <a:rPr lang="en-US" dirty="0">
+                <a:hlinkClick r:id="rId2"/>
+              </a:rPr>
+              <a:t>https://docs.google.com/spreadsheets/d/1db8BrcEUeQRn3oBzaJ4lJ8roCntTZu5mRIIfiXznaAo/edit?usp=sharing</a:t>
+            </a:r>
+            <a:endParaRPr lang="en-US" dirty="0"/>
+          </a:p>
+          <a:p>
+            <a:endParaRPr lang="en-US" dirty="0"/>
+          </a:p>
+          <a:p>
+            <a:r>
+              <a:rPr lang="en-US" dirty="0"/>
+              <a:t>Competitive Audit:</a:t>
+            </a:r>
+          </a:p>
+          <a:p>
+            <a:r>
+              <a:rPr lang="en-US" dirty="0">
+                <a:hlinkClick r:id="rId3"/>
+              </a:rPr>
+              <a:t>https://docs.google.com/spreadsheets/d/1_796_-ZXE3fC_RS2nuEiqIksuk6GEkEqd8B8mTLOO9U/edit?usp=sharing</a:t>
+            </a:r>
+            <a:endParaRPr lang="en-US" dirty="0"/>
+          </a:p>
+          <a:p>
+            <a:endParaRPr lang="en-US" dirty="0"/>
+          </a:p>
+          <a:p>
+            <a:endParaRPr lang="en-US" dirty="0"/>
+          </a:p>
+          <a:p>
+            <a:endParaRPr lang="en-US" dirty="0"/>
+          </a:p>
+          <a:p>
+            <a:r>
+              <a:rPr lang="en-US" sz="2400" b="1" dirty="0"/>
+              <a:t>Observations Summary:</a:t>
+            </a:r>
+          </a:p>
+        </p:txBody>
+      </p:sp>
+    </p:spTree>
+    <p:extLst>
+      <p:ext uri="{BB962C8B-B14F-4D97-AF65-F5344CB8AC3E}">
+        <p14:creationId xmlns:p14="http://schemas.microsoft.com/office/powerpoint/2010/main" val="3218425760"/>
       </p:ext>
     </p:extLst>
   </p:cSld>
@@ -3638,7 +4068,15 @@
             </a:r>
             <a:r>
               <a:rPr lang="en-US" dirty="0"/>
-              <a:t>: Cluj-Napoca, Romania</a:t>
+              <a:t>: </a:t>
+            </a:r>
+            <a:r>
+              <a:rPr lang="en-US" dirty="0" err="1"/>
+              <a:t>Botosani</a:t>
+            </a:r>
+            <a:r>
+              <a:rPr lang="en-US" dirty="0"/>
+              <a:t>, Romania</a:t>
             </a:r>
           </a:p>
           <a:p>
@@ -3666,27 +4104,19 @@
             </a:r>
             <a:r>
               <a:rPr lang="en-US" dirty="0"/>
-              <a:t>: "</a:t>
+              <a:t>: “</a:t>
             </a:r>
             <a:r>
               <a:rPr lang="en-US" dirty="0" err="1"/>
-              <a:t>Scoala</a:t>
+              <a:t>Liceul</a:t>
             </a:r>
             <a:r>
               <a:rPr lang="en-US" dirty="0"/>
-              <a:t> </a:t>
+              <a:t> Pedagogic Nicolae </a:t>
             </a:r>
             <a:r>
               <a:rPr lang="en-US" dirty="0" err="1"/>
-              <a:t>Gimnaziala</a:t>
-            </a:r>
-            <a:r>
-              <a:rPr lang="en-US" dirty="0"/>
-              <a:t> Nicolae </a:t>
-            </a:r>
-            <a:r>
-              <a:rPr lang="en-US" dirty="0" err="1"/>
-              <a:t>Titulescu</a:t>
+              <a:t>Iorga</a:t>
             </a:r>
             <a:r>
               <a:rPr lang="en-US" dirty="0"/>
@@ -4214,7 +4644,15 @@
             </a:r>
             <a:r>
               <a:rPr lang="en-US" dirty="0"/>
-              <a:t>: Timisoara, Romania</a:t>
+              <a:t>: </a:t>
+            </a:r>
+            <a:r>
+              <a:rPr lang="en-US" dirty="0" err="1"/>
+              <a:t>Botosani</a:t>
+            </a:r>
+            <a:r>
+              <a:rPr lang="en-US" dirty="0"/>
+              <a:t>, Romania</a:t>
             </a:r>
           </a:p>
           <a:p>
@@ -4242,7 +4680,7 @@
             </a:r>
             <a:r>
               <a:rPr lang="en-US" dirty="0"/>
-              <a:t>: "</a:t>
+              <a:t>: “</a:t>
             </a:r>
             <a:r>
               <a:rPr lang="en-US" dirty="0" err="1"/>
@@ -4250,23 +4688,7 @@
             </a:r>
             <a:r>
               <a:rPr lang="en-US" dirty="0"/>
-              <a:t> </a:t>
-            </a:r>
-            <a:r>
-              <a:rPr lang="en-US" dirty="0" err="1"/>
-              <a:t>Teoretic</a:t>
-            </a:r>
-            <a:r>
-              <a:rPr lang="en-US" dirty="0"/>
-              <a:t> Grigore </a:t>
-            </a:r>
-            <a:r>
-              <a:rPr lang="en-US" dirty="0" err="1"/>
-              <a:t>Moisil</a:t>
-            </a:r>
-            <a:r>
-              <a:rPr lang="en-US" dirty="0"/>
-              <a:t>“</a:t>
+              <a:t> Mihai Eminescu“</a:t>
             </a:r>
           </a:p>
           <a:p>
@@ -4812,15 +5234,7 @@
             </a:r>
             <a:r>
               <a:rPr lang="en-US" dirty="0"/>
-              <a:t>:</a:t>
-            </a:r>
-            <a:r>
-              <a:rPr lang="en-US" b="1" dirty="0"/>
-              <a:t> </a:t>
-            </a:r>
-            <a:r>
-              <a:rPr lang="en-US" dirty="0"/>
-              <a:t>Brasov, Romania</a:t>
+              <a:t>: Iasi, Romania</a:t>
             </a:r>
           </a:p>
           <a:p>
@@ -4852,11 +5266,19 @@
             </a:r>
             <a:r>
               <a:rPr lang="en-US" dirty="0" err="1"/>
-              <a:t>Colegiul</a:t>
+              <a:t>Liceul</a:t>
             </a:r>
             <a:r>
               <a:rPr lang="en-US" dirty="0"/>
-              <a:t> National Unirea“</a:t>
+              <a:t> Regina Maria </a:t>
+            </a:r>
+            <a:r>
+              <a:rPr lang="en-US" dirty="0" err="1"/>
+              <a:t>Dorohoi</a:t>
+            </a:r>
+            <a:r>
+              <a:rPr lang="en-US" dirty="0"/>
+              <a:t>“</a:t>
             </a:r>
           </a:p>
           <a:p>
@@ -5235,6 +5657,464 @@
     <p:extLst>
       <p:ext uri="{BB962C8B-B14F-4D97-AF65-F5344CB8AC3E}">
         <p14:creationId xmlns:p14="http://schemas.microsoft.com/office/powerpoint/2010/main" val="1519459542"/>
+      </p:ext>
+    </p:extLst>
+  </p:cSld>
+  <p:clrMapOvr>
+    <a:masterClrMapping/>
+  </p:clrMapOvr>
+</p:sld>
+</file>
+
+<file path=ppt/slides/slide8.xml><?xml version="1.0" encoding="utf-8"?>
+<p:sld xmlns:a="http://schemas.openxmlformats.org/drawingml/2006/main" xmlns:r="http://schemas.openxmlformats.org/officeDocument/2006/relationships" xmlns:p="http://schemas.openxmlformats.org/presentationml/2006/main">
+  <p:cSld>
+    <p:bg>
+      <p:bgPr>
+        <a:gradFill>
+          <a:gsLst>
+            <a:gs pos="0">
+              <a:schemeClr val="accent1">
+                <a:lumMod val="5000"/>
+                <a:lumOff val="95000"/>
+              </a:schemeClr>
+            </a:gs>
+            <a:gs pos="74000">
+              <a:schemeClr val="accent1">
+                <a:lumMod val="45000"/>
+                <a:lumOff val="55000"/>
+              </a:schemeClr>
+            </a:gs>
+            <a:gs pos="83000">
+              <a:schemeClr val="accent1">
+                <a:lumMod val="45000"/>
+                <a:lumOff val="55000"/>
+              </a:schemeClr>
+            </a:gs>
+            <a:gs pos="100000">
+              <a:schemeClr val="accent1">
+                <a:lumMod val="30000"/>
+                <a:lumOff val="70000"/>
+              </a:schemeClr>
+            </a:gs>
+          </a:gsLst>
+          <a:lin ang="5400000" scaled="1"/>
+        </a:gradFill>
+        <a:effectLst/>
+      </p:bgPr>
+    </p:bg>
+    <p:spTree>
+      <p:nvGrpSpPr>
+        <p:cNvPr id="1" name=""/>
+        <p:cNvGrpSpPr/>
+        <p:nvPr/>
+      </p:nvGrpSpPr>
+      <p:grpSpPr>
+        <a:xfrm>
+          <a:off x="0" y="0"/>
+          <a:ext cx="0" cy="0"/>
+          <a:chOff x="0" y="0"/>
+          <a:chExt cx="0" cy="0"/>
+        </a:xfrm>
+      </p:grpSpPr>
+      <p:sp>
+        <p:nvSpPr>
+          <p:cNvPr id="2" name="Title 1">
+            <a:extLst>
+              <a:ext uri="{FF2B5EF4-FFF2-40B4-BE49-F238E27FC236}">
+                <a16:creationId xmlns:a16="http://schemas.microsoft.com/office/drawing/2014/main" id="{4EE41A59-8F65-80D2-B2E5-94A1ACFDE246}"/>
+              </a:ext>
+            </a:extLst>
+          </p:cNvPr>
+          <p:cNvSpPr>
+            <a:spLocks noGrp="1"/>
+          </p:cNvSpPr>
+          <p:nvPr>
+            <p:ph type="ctrTitle"/>
+          </p:nvPr>
+        </p:nvSpPr>
+        <p:spPr/>
+        <p:txBody>
+          <a:bodyPr>
+            <a:normAutofit/>
+          </a:bodyPr>
+          <a:lstStyle/>
+          <a:p>
+            <a:r>
+              <a:rPr lang="en-US" sz="7200" dirty="0">
+                <a:latin typeface="Arial Black" panose="020B0A04020102020204" pitchFamily="34" charset="0"/>
+              </a:rPr>
+              <a:t>Research</a:t>
+            </a:r>
+          </a:p>
+        </p:txBody>
+      </p:sp>
+      <p:sp>
+        <p:nvSpPr>
+          <p:cNvPr id="5" name="Subtitle 4">
+            <a:extLst>
+              <a:ext uri="{FF2B5EF4-FFF2-40B4-BE49-F238E27FC236}">
+                <a16:creationId xmlns:a16="http://schemas.microsoft.com/office/drawing/2014/main" id="{DF5A9E23-C217-D1FF-6372-6E56322AF61B}"/>
+              </a:ext>
+            </a:extLst>
+          </p:cNvPr>
+          <p:cNvSpPr>
+            <a:spLocks noGrp="1"/>
+          </p:cNvSpPr>
+          <p:nvPr>
+            <p:ph type="subTitle" idx="1"/>
+          </p:nvPr>
+        </p:nvSpPr>
+        <p:spPr/>
+        <p:txBody>
+          <a:bodyPr>
+            <a:normAutofit/>
+          </a:bodyPr>
+          <a:lstStyle/>
+          <a:p>
+            <a:r>
+              <a:rPr lang="en-US" sz="3600" dirty="0"/>
+              <a:t>- Tactics Used -</a:t>
+            </a:r>
+          </a:p>
+        </p:txBody>
+      </p:sp>
+    </p:spTree>
+    <p:extLst>
+      <p:ext uri="{BB962C8B-B14F-4D97-AF65-F5344CB8AC3E}">
+        <p14:creationId xmlns:p14="http://schemas.microsoft.com/office/powerpoint/2010/main" val="4284966224"/>
+      </p:ext>
+    </p:extLst>
+  </p:cSld>
+  <p:clrMapOvr>
+    <a:masterClrMapping/>
+  </p:clrMapOvr>
+</p:sld>
+</file>
+
+<file path=ppt/slides/slide9.xml><?xml version="1.0" encoding="utf-8"?>
+<p:sld xmlns:a="http://schemas.openxmlformats.org/drawingml/2006/main" xmlns:r="http://schemas.openxmlformats.org/officeDocument/2006/relationships" xmlns:p="http://schemas.openxmlformats.org/presentationml/2006/main">
+  <p:cSld>
+    <p:bg>
+      <p:bgPr>
+        <a:gradFill>
+          <a:gsLst>
+            <a:gs pos="0">
+              <a:schemeClr val="accent1">
+                <a:lumMod val="5000"/>
+                <a:lumOff val="95000"/>
+              </a:schemeClr>
+            </a:gs>
+            <a:gs pos="74000">
+              <a:schemeClr val="accent1">
+                <a:lumMod val="45000"/>
+                <a:lumOff val="55000"/>
+              </a:schemeClr>
+            </a:gs>
+            <a:gs pos="83000">
+              <a:schemeClr val="accent1">
+                <a:lumMod val="45000"/>
+                <a:lumOff val="55000"/>
+              </a:schemeClr>
+            </a:gs>
+            <a:gs pos="100000">
+              <a:schemeClr val="accent1">
+                <a:lumMod val="30000"/>
+                <a:lumOff val="70000"/>
+              </a:schemeClr>
+            </a:gs>
+          </a:gsLst>
+          <a:lin ang="5400000" scaled="1"/>
+        </a:gradFill>
+        <a:effectLst/>
+      </p:bgPr>
+    </p:bg>
+    <p:spTree>
+      <p:nvGrpSpPr>
+        <p:cNvPr id="1" name=""/>
+        <p:cNvGrpSpPr/>
+        <p:nvPr/>
+      </p:nvGrpSpPr>
+      <p:grpSpPr>
+        <a:xfrm>
+          <a:off x="0" y="0"/>
+          <a:ext cx="0" cy="0"/>
+          <a:chOff x="0" y="0"/>
+          <a:chExt cx="0" cy="0"/>
+        </a:xfrm>
+      </p:grpSpPr>
+      <p:sp>
+        <p:nvSpPr>
+          <p:cNvPr id="2" name="Title 1">
+            <a:extLst>
+              <a:ext uri="{FF2B5EF4-FFF2-40B4-BE49-F238E27FC236}">
+                <a16:creationId xmlns:a16="http://schemas.microsoft.com/office/drawing/2014/main" id="{3F7378E8-9A1D-EFEE-4B57-32709834FE31}"/>
+              </a:ext>
+            </a:extLst>
+          </p:cNvPr>
+          <p:cNvSpPr>
+            <a:spLocks noGrp="1"/>
+          </p:cNvSpPr>
+          <p:nvPr>
+            <p:ph type="title"/>
+          </p:nvPr>
+        </p:nvSpPr>
+        <p:spPr>
+          <a:noFill/>
+        </p:spPr>
+        <p:txBody>
+          <a:bodyPr/>
+          <a:lstStyle/>
+          <a:p>
+            <a:pPr algn="ctr"/>
+            <a:r>
+              <a:rPr lang="en-US" b="1" dirty="0"/>
+              <a:t>User Interviews</a:t>
+            </a:r>
+          </a:p>
+        </p:txBody>
+      </p:sp>
+      <p:sp>
+        <p:nvSpPr>
+          <p:cNvPr id="3" name="Content Placeholder 2">
+            <a:extLst>
+              <a:ext uri="{FF2B5EF4-FFF2-40B4-BE49-F238E27FC236}">
+                <a16:creationId xmlns:a16="http://schemas.microsoft.com/office/drawing/2014/main" id="{64AE1E1A-8400-AA26-CD1F-2482A35F57EA}"/>
+              </a:ext>
+            </a:extLst>
+          </p:cNvPr>
+          <p:cNvSpPr>
+            <a:spLocks noGrp="1"/>
+          </p:cNvSpPr>
+          <p:nvPr>
+            <p:ph sz="half" idx="1"/>
+          </p:nvPr>
+        </p:nvSpPr>
+        <p:spPr/>
+        <p:txBody>
+          <a:bodyPr>
+            <a:normAutofit lnSpcReduction="10000"/>
+          </a:bodyPr>
+          <a:lstStyle/>
+          <a:p>
+            <a:pPr marL="0" indent="0">
+              <a:buNone/>
+            </a:pPr>
+            <a:r>
+              <a:rPr lang="en-US" sz="2000" b="1" dirty="0"/>
+              <a:t>We conducted informal interviews with three target participants:</a:t>
+            </a:r>
+          </a:p>
+          <a:p>
+            <a:pPr>
+              <a:buFont typeface="Arial" panose="020B0604020202020204" pitchFamily="34" charset="0"/>
+              <a:buChar char="•"/>
+            </a:pPr>
+            <a:r>
+              <a:rPr lang="en-US" sz="1600" dirty="0"/>
+              <a:t>A parent of a 12-year-old student (</a:t>
+            </a:r>
+            <a:r>
+              <a:rPr lang="en-US" sz="1600" dirty="0" err="1"/>
+              <a:t>Botosani</a:t>
+            </a:r>
+            <a:r>
+              <a:rPr lang="en-US" sz="1600" dirty="0"/>
+              <a:t>)</a:t>
+            </a:r>
+          </a:p>
+          <a:p>
+            <a:pPr>
+              <a:buFont typeface="Arial" panose="020B0604020202020204" pitchFamily="34" charset="0"/>
+              <a:buChar char="•"/>
+            </a:pPr>
+            <a:r>
+              <a:rPr lang="en-US" sz="1600" dirty="0"/>
+              <a:t>A 14-year-old student (</a:t>
+            </a:r>
+            <a:r>
+              <a:rPr lang="en-US" sz="1600" dirty="0" err="1"/>
+              <a:t>Botosani</a:t>
+            </a:r>
+            <a:r>
+              <a:rPr lang="en-US" sz="1600" dirty="0"/>
+              <a:t>)</a:t>
+            </a:r>
+          </a:p>
+          <a:p>
+            <a:pPr>
+              <a:buFont typeface="Arial" panose="020B0604020202020204" pitchFamily="34" charset="0"/>
+              <a:buChar char="•"/>
+            </a:pPr>
+            <a:r>
+              <a:rPr lang="en-US" sz="1600" dirty="0"/>
+              <a:t>A retired hobbyist LEGO fan (Iasi)</a:t>
+            </a:r>
+          </a:p>
+          <a:p>
+            <a:r>
+              <a:rPr lang="en-US" sz="1600" b="1" dirty="0"/>
+              <a:t>Goal</a:t>
+            </a:r>
+            <a:r>
+              <a:rPr lang="en-US" sz="1600" dirty="0"/>
+              <a:t>: To understand motivations, tech comfort, device preferences, and expectations for AR integration in LEGO building.</a:t>
+            </a:r>
+          </a:p>
+          <a:p>
+            <a:pPr marL="0" indent="0">
+              <a:buNone/>
+            </a:pPr>
+            <a:r>
+              <a:rPr lang="en-US" sz="2000" b="1" dirty="0"/>
+              <a:t>Insights gathered:</a:t>
+            </a:r>
+          </a:p>
+          <a:p>
+            <a:pPr>
+              <a:buFont typeface="Arial" panose="020B0604020202020204" pitchFamily="34" charset="0"/>
+              <a:buChar char="•"/>
+            </a:pPr>
+            <a:r>
+              <a:rPr lang="en-US" sz="1600" dirty="0"/>
+              <a:t>Parents value screen-time moderation and want mobile-first control</a:t>
+            </a:r>
+          </a:p>
+          <a:p>
+            <a:pPr>
+              <a:buFont typeface="Arial" panose="020B0604020202020204" pitchFamily="34" charset="0"/>
+              <a:buChar char="•"/>
+            </a:pPr>
+            <a:r>
+              <a:rPr lang="en-US" sz="1600" dirty="0"/>
+              <a:t>Teens demand fast, gamified AR guidance</a:t>
+            </a:r>
+          </a:p>
+          <a:p>
+            <a:pPr>
+              <a:buFont typeface="Arial" panose="020B0604020202020204" pitchFamily="34" charset="0"/>
+              <a:buChar char="•"/>
+            </a:pPr>
+            <a:r>
+              <a:rPr lang="en-US" sz="1600" dirty="0"/>
+              <a:t>Older adults desire readable UIs and non-AR support</a:t>
+            </a:r>
+          </a:p>
+          <a:p>
+            <a:endParaRPr lang="en-US" sz="2000" dirty="0"/>
+          </a:p>
+          <a:p>
+            <a:endParaRPr lang="en-US" dirty="0"/>
+          </a:p>
+        </p:txBody>
+      </p:sp>
+      <p:sp>
+        <p:nvSpPr>
+          <p:cNvPr id="4" name="Content Placeholder 3">
+            <a:extLst>
+              <a:ext uri="{FF2B5EF4-FFF2-40B4-BE49-F238E27FC236}">
+                <a16:creationId xmlns:a16="http://schemas.microsoft.com/office/drawing/2014/main" id="{9C9B7C74-20FF-48F9-30A7-3097C4D50754}"/>
+              </a:ext>
+            </a:extLst>
+          </p:cNvPr>
+          <p:cNvSpPr>
+            <a:spLocks noGrp="1"/>
+          </p:cNvSpPr>
+          <p:nvPr>
+            <p:ph sz="half" idx="2"/>
+          </p:nvPr>
+        </p:nvSpPr>
+        <p:spPr/>
+        <p:txBody>
+          <a:bodyPr>
+            <a:normAutofit lnSpcReduction="10000"/>
+          </a:bodyPr>
+          <a:lstStyle/>
+          <a:p>
+            <a:pPr marL="0" indent="0">
+              <a:buNone/>
+            </a:pPr>
+            <a:r>
+              <a:rPr lang="en-US" sz="2000" b="1" dirty="0"/>
+              <a:t>Some of the questions asked: </a:t>
+            </a:r>
+          </a:p>
+          <a:p>
+            <a:r>
+              <a:rPr lang="en-US" sz="1600" dirty="0"/>
+              <a:t>What do you enjoy most about building LEGO?</a:t>
+            </a:r>
+          </a:p>
+          <a:p>
+            <a:r>
+              <a:rPr lang="en-US" sz="1600" dirty="0"/>
+              <a:t>Have you ever used a mobile app or headset while building?</a:t>
+            </a:r>
+          </a:p>
+          <a:p>
+            <a:r>
+              <a:rPr lang="en-US" sz="1600" dirty="0"/>
+              <a:t>What would make LEGO building easier or more fun for you?</a:t>
+            </a:r>
+          </a:p>
+          <a:p>
+            <a:r>
+              <a:rPr lang="en-US" sz="1600" dirty="0"/>
+              <a:t>How comfortable are you with AR or wearable devices?</a:t>
+            </a:r>
+          </a:p>
+          <a:p>
+            <a:endParaRPr lang="en-US" sz="1600" dirty="0"/>
+          </a:p>
+          <a:p>
+            <a:pPr marL="0" indent="0">
+              <a:buNone/>
+            </a:pPr>
+            <a:r>
+              <a:rPr lang="en-US" sz="2000" b="1" dirty="0"/>
+              <a:t>Notable observations:</a:t>
+            </a:r>
+          </a:p>
+          <a:p>
+            <a:r>
+              <a:rPr lang="en-US" sz="1600" dirty="0"/>
+              <a:t>Irina: “If my son could follow the steps in AR and I could check progress on my phone, that would be amazing.”</a:t>
+            </a:r>
+          </a:p>
+          <a:p>
+            <a:r>
+              <a:rPr lang="en-US" sz="1600" dirty="0"/>
+              <a:t>Vlad: “I’d love if I could compete against friends while building.”</a:t>
+            </a:r>
+          </a:p>
+          <a:p>
+            <a:r>
+              <a:rPr lang="en-US" sz="1600" dirty="0" err="1"/>
+              <a:t>Doru</a:t>
+            </a:r>
+            <a:r>
+              <a:rPr lang="en-US" sz="1600" dirty="0"/>
+              <a:t>: “I don’t want to wear anything on my head — I prefer printed instructions and simple apps.”</a:t>
+            </a:r>
+          </a:p>
+          <a:p>
+            <a:pPr marL="0" indent="0">
+              <a:buNone/>
+            </a:pPr>
+            <a:endParaRPr lang="en-US" sz="2000" dirty="0"/>
+          </a:p>
+          <a:p>
+            <a:pPr marL="0" indent="0">
+              <a:buNone/>
+            </a:pPr>
+            <a:endParaRPr lang="en-US" sz="1600" dirty="0"/>
+          </a:p>
+        </p:txBody>
+      </p:sp>
+    </p:spTree>
+    <p:extLst>
+      <p:ext uri="{BB962C8B-B14F-4D97-AF65-F5344CB8AC3E}">
+        <p14:creationId xmlns:p14="http://schemas.microsoft.com/office/powerpoint/2010/main" val="1793057793"/>
       </p:ext>
     </p:extLst>
   </p:cSld>

</xml_diff>